<commit_message>
Update Inventory app - Avram Alexandra, Grecu Georgian.pptx
</commit_message>
<xml_diff>
--- a/Materiale/Inventory app - Avram Alexandra, Grecu Georgian.pptx
+++ b/Materiale/Inventory app - Avram Alexandra, Grecu Georgian.pptx
@@ -307,7 +307,7 @@
           <a:p>
             <a:fld id="{608B818F-4298-41C9-BB4A-DBC1AD3F7EE9}" type="datetimeFigureOut">
               <a:rPr lang="en-US" smtClean="0"/>
-              <a:t>5/22/2020</a:t>
+              <a:t>5/27/2020</a:t>
             </a:fld>
             <a:endParaRPr lang="en-US"/>
           </a:p>
@@ -605,7 +605,7 @@
           <a:p>
             <a:fld id="{608B818F-4298-41C9-BB4A-DBC1AD3F7EE9}" type="datetimeFigureOut">
               <a:rPr lang="en-US" smtClean="0"/>
-              <a:t>5/22/2020</a:t>
+              <a:t>5/27/2020</a:t>
             </a:fld>
             <a:endParaRPr lang="en-US"/>
           </a:p>
@@ -797,7 +797,7 @@
           <a:p>
             <a:fld id="{608B818F-4298-41C9-BB4A-DBC1AD3F7EE9}" type="datetimeFigureOut">
               <a:rPr lang="en-US" smtClean="0"/>
-              <a:t>5/22/2020</a:t>
+              <a:t>5/27/2020</a:t>
             </a:fld>
             <a:endParaRPr lang="en-US"/>
           </a:p>
@@ -1058,7 +1058,7 @@
           <a:p>
             <a:fld id="{608B818F-4298-41C9-BB4A-DBC1AD3F7EE9}" type="datetimeFigureOut">
               <a:rPr lang="en-US" smtClean="0"/>
-              <a:t>5/22/2020</a:t>
+              <a:t>5/27/2020</a:t>
             </a:fld>
             <a:endParaRPr lang="en-US"/>
           </a:p>
@@ -1482,7 +1482,7 @@
           <a:p>
             <a:fld id="{608B818F-4298-41C9-BB4A-DBC1AD3F7EE9}" type="datetimeFigureOut">
               <a:rPr lang="en-US" smtClean="0"/>
-              <a:t>5/22/2020</a:t>
+              <a:t>5/27/2020</a:t>
             </a:fld>
             <a:endParaRPr lang="en-US"/>
           </a:p>
@@ -2019,7 +2019,7 @@
           <a:p>
             <a:fld id="{608B818F-4298-41C9-BB4A-DBC1AD3F7EE9}" type="datetimeFigureOut">
               <a:rPr lang="en-US" smtClean="0"/>
-              <a:t>5/22/2020</a:t>
+              <a:t>5/27/2020</a:t>
             </a:fld>
             <a:endParaRPr lang="en-US"/>
           </a:p>
@@ -2883,7 +2883,7 @@
           <a:p>
             <a:fld id="{608B818F-4298-41C9-BB4A-DBC1AD3F7EE9}" type="datetimeFigureOut">
               <a:rPr lang="en-US" smtClean="0"/>
-              <a:t>5/22/2020</a:t>
+              <a:t>5/27/2020</a:t>
             </a:fld>
             <a:endParaRPr lang="en-US"/>
           </a:p>
@@ -3053,7 +3053,7 @@
           <a:p>
             <a:fld id="{608B818F-4298-41C9-BB4A-DBC1AD3F7EE9}" type="datetimeFigureOut">
               <a:rPr lang="en-US" smtClean="0"/>
-              <a:t>5/22/2020</a:t>
+              <a:t>5/27/2020</a:t>
             </a:fld>
             <a:endParaRPr lang="en-US"/>
           </a:p>
@@ -3237,7 +3237,7 @@
           <a:p>
             <a:fld id="{608B818F-4298-41C9-BB4A-DBC1AD3F7EE9}" type="datetimeFigureOut">
               <a:rPr lang="en-US" smtClean="0"/>
-              <a:t>5/22/2020</a:t>
+              <a:t>5/27/2020</a:t>
             </a:fld>
             <a:endParaRPr lang="en-US"/>
           </a:p>
@@ -3407,7 +3407,7 @@
           <a:p>
             <a:fld id="{608B818F-4298-41C9-BB4A-DBC1AD3F7EE9}" type="datetimeFigureOut">
               <a:rPr lang="en-US" smtClean="0"/>
-              <a:t>5/22/2020</a:t>
+              <a:t>5/27/2020</a:t>
             </a:fld>
             <a:endParaRPr lang="en-US"/>
           </a:p>
@@ -3651,7 +3651,7 @@
           <a:p>
             <a:fld id="{608B818F-4298-41C9-BB4A-DBC1AD3F7EE9}" type="datetimeFigureOut">
               <a:rPr lang="en-US" smtClean="0"/>
-              <a:t>5/22/2020</a:t>
+              <a:t>5/27/2020</a:t>
             </a:fld>
             <a:endParaRPr lang="en-US"/>
           </a:p>
@@ -3887,7 +3887,7 @@
           <a:p>
             <a:fld id="{608B818F-4298-41C9-BB4A-DBC1AD3F7EE9}" type="datetimeFigureOut">
               <a:rPr lang="en-US" smtClean="0"/>
-              <a:t>5/22/2020</a:t>
+              <a:t>5/27/2020</a:t>
             </a:fld>
             <a:endParaRPr lang="en-US"/>
           </a:p>
@@ -4353,7 +4353,7 @@
           <a:p>
             <a:fld id="{608B818F-4298-41C9-BB4A-DBC1AD3F7EE9}" type="datetimeFigureOut">
               <a:rPr lang="en-US" smtClean="0"/>
-              <a:t>5/22/2020</a:t>
+              <a:t>5/27/2020</a:t>
             </a:fld>
             <a:endParaRPr lang="en-US"/>
           </a:p>
@@ -4471,7 +4471,7 @@
           <a:p>
             <a:fld id="{608B818F-4298-41C9-BB4A-DBC1AD3F7EE9}" type="datetimeFigureOut">
               <a:rPr lang="en-US" smtClean="0"/>
-              <a:t>5/22/2020</a:t>
+              <a:t>5/27/2020</a:t>
             </a:fld>
             <a:endParaRPr lang="en-US"/>
           </a:p>
@@ -4566,7 +4566,7 @@
           <a:p>
             <a:fld id="{608B818F-4298-41C9-BB4A-DBC1AD3F7EE9}" type="datetimeFigureOut">
               <a:rPr lang="en-US" smtClean="0"/>
-              <a:t>5/22/2020</a:t>
+              <a:t>5/27/2020</a:t>
             </a:fld>
             <a:endParaRPr lang="en-US"/>
           </a:p>
@@ -4821,7 +4821,7 @@
           <a:p>
             <a:fld id="{608B818F-4298-41C9-BB4A-DBC1AD3F7EE9}" type="datetimeFigureOut">
               <a:rPr lang="en-US" smtClean="0"/>
-              <a:t>5/22/2020</a:t>
+              <a:t>5/27/2020</a:t>
             </a:fld>
             <a:endParaRPr lang="en-US"/>
           </a:p>
@@ -5121,7 +5121,7 @@
           <a:p>
             <a:fld id="{608B818F-4298-41C9-BB4A-DBC1AD3F7EE9}" type="datetimeFigureOut">
               <a:rPr lang="en-US" smtClean="0"/>
-              <a:t>5/22/2020</a:t>
+              <a:t>5/27/2020</a:t>
             </a:fld>
             <a:endParaRPr lang="en-US"/>
           </a:p>
@@ -5355,7 +5355,7 @@
           <a:p>
             <a:fld id="{608B818F-4298-41C9-BB4A-DBC1AD3F7EE9}" type="datetimeFigureOut">
               <a:rPr lang="en-US" smtClean="0"/>
-              <a:t>5/22/2020</a:t>
+              <a:t>5/27/2020</a:t>
             </a:fld>
             <a:endParaRPr lang="en-US"/>
           </a:p>
@@ -6157,13 +6157,13 @@
   <p:clrMapOvr>
     <a:masterClrMapping/>
   </p:clrMapOvr>
-  <mc:AlternateContent xmlns:mc="http://schemas.openxmlformats.org/markup-compatibility/2006">
-    <mc:Choice xmlns:p159="http://schemas.microsoft.com/office/powerpoint/2015/09/main" Requires="p159">
+  <mc:AlternateContent xmlns:mc="http://schemas.openxmlformats.org/markup-compatibility/2006" xmlns:p159="http://schemas.microsoft.com/office/powerpoint/2015/09/main">
+    <mc:Choice Requires="p159">
       <p:transition xmlns:p14="http://schemas.microsoft.com/office/powerpoint/2010/main" spd="slow" p14:dur="2000">
         <p159:morph option="byObject"/>
       </p:transition>
     </mc:Choice>
-    <mc:Fallback>
+    <mc:Fallback xmlns="">
       <p:transition spd="slow">
         <p:fade/>
       </p:transition>
@@ -6852,13 +6852,13 @@
   <p:clrMapOvr>
     <a:masterClrMapping/>
   </p:clrMapOvr>
-  <mc:AlternateContent xmlns:mc="http://schemas.openxmlformats.org/markup-compatibility/2006">
-    <mc:Choice xmlns:p159="http://schemas.microsoft.com/office/powerpoint/2015/09/main" Requires="p159">
+  <mc:AlternateContent xmlns:mc="http://schemas.openxmlformats.org/markup-compatibility/2006" xmlns:p159="http://schemas.microsoft.com/office/powerpoint/2015/09/main">
+    <mc:Choice Requires="p159">
       <p:transition xmlns:p14="http://schemas.microsoft.com/office/powerpoint/2010/main" spd="slow" p14:dur="2000">
         <p159:morph option="byObject"/>
       </p:transition>
     </mc:Choice>
-    <mc:Fallback>
+    <mc:Fallback xmlns="">
       <p:transition spd="slow">
         <p:fade/>
       </p:transition>
@@ -6942,13 +6942,13 @@
   <p:clrMapOvr>
     <a:masterClrMapping/>
   </p:clrMapOvr>
-  <mc:AlternateContent xmlns:mc="http://schemas.openxmlformats.org/markup-compatibility/2006">
-    <mc:Choice xmlns:p159="http://schemas.microsoft.com/office/powerpoint/2015/09/main" Requires="p159">
+  <mc:AlternateContent xmlns:mc="http://schemas.openxmlformats.org/markup-compatibility/2006" xmlns:p159="http://schemas.microsoft.com/office/powerpoint/2015/09/main">
+    <mc:Choice Requires="p159">
       <p:transition xmlns:p14="http://schemas.microsoft.com/office/powerpoint/2010/main" spd="slow" p14:dur="2000">
         <p159:morph option="byObject"/>
       </p:transition>
     </mc:Choice>
-    <mc:Fallback>
+    <mc:Fallback xmlns="">
       <p:transition spd="slow">
         <p:fade/>
       </p:transition>
@@ -7880,13 +7880,13 @@
   <p:clrMapOvr>
     <a:masterClrMapping/>
   </p:clrMapOvr>
-  <mc:AlternateContent xmlns:mc="http://schemas.openxmlformats.org/markup-compatibility/2006">
-    <mc:Choice xmlns:p159="http://schemas.microsoft.com/office/powerpoint/2015/09/main" Requires="p159">
+  <mc:AlternateContent xmlns:mc="http://schemas.openxmlformats.org/markup-compatibility/2006" xmlns:p159="http://schemas.microsoft.com/office/powerpoint/2015/09/main">
+    <mc:Choice Requires="p159">
       <p:transition xmlns:p14="http://schemas.microsoft.com/office/powerpoint/2010/main" spd="slow" p14:dur="2000">
         <p159:morph option="byObject"/>
       </p:transition>
     </mc:Choice>
-    <mc:Fallback>
+    <mc:Fallback xmlns="">
       <p:transition spd="slow">
         <p:fade/>
       </p:transition>
@@ -8005,7 +8005,7 @@
           <a:p>
             <a:pPr algn="ctr"/>
             <a:r>
-              <a:rPr lang="en-US" u="sng" dirty="0">
+              <a:rPr lang="en-US">
                 <a:hlinkClick r:id="rId3"/>
               </a:rPr>
               <a:t>https://github.com/alexaavr/Alexandra_Avram</a:t>
@@ -8135,13 +8135,13 @@
   <p:clrMapOvr>
     <a:masterClrMapping/>
   </p:clrMapOvr>
-  <mc:AlternateContent xmlns:mc="http://schemas.openxmlformats.org/markup-compatibility/2006">
-    <mc:Choice xmlns:p159="http://schemas.microsoft.com/office/powerpoint/2015/09/main" Requires="p159">
+  <mc:AlternateContent xmlns:mc="http://schemas.openxmlformats.org/markup-compatibility/2006" xmlns:p159="http://schemas.microsoft.com/office/powerpoint/2015/09/main">
+    <mc:Choice Requires="p159">
       <p:transition xmlns:p14="http://schemas.microsoft.com/office/powerpoint/2010/main" spd="slow" p14:dur="2000">
         <p159:morph option="byObject"/>
       </p:transition>
     </mc:Choice>
-    <mc:Fallback>
+    <mc:Fallback xmlns="">
       <p:transition spd="slow">
         <p:fade/>
       </p:transition>
@@ -9198,13 +9198,13 @@
   <p:clrMapOvr>
     <a:masterClrMapping/>
   </p:clrMapOvr>
-  <mc:AlternateContent xmlns:mc="http://schemas.openxmlformats.org/markup-compatibility/2006">
-    <mc:Choice xmlns:p159="http://schemas.microsoft.com/office/powerpoint/2015/09/main" Requires="p159">
+  <mc:AlternateContent xmlns:mc="http://schemas.openxmlformats.org/markup-compatibility/2006" xmlns:p159="http://schemas.microsoft.com/office/powerpoint/2015/09/main">
+    <mc:Choice Requires="p159">
       <p:transition xmlns:p14="http://schemas.microsoft.com/office/powerpoint/2010/main" spd="slow" p14:dur="2000">
         <p159:morph option="byObject"/>
       </p:transition>
     </mc:Choice>
-    <mc:Fallback>
+    <mc:Fallback xmlns="">
       <p:transition spd="slow">
         <p:fade/>
       </p:transition>
@@ -9743,13 +9743,13 @@
   <p:clrMapOvr>
     <a:masterClrMapping/>
   </p:clrMapOvr>
-  <mc:AlternateContent xmlns:mc="http://schemas.openxmlformats.org/markup-compatibility/2006">
-    <mc:Choice xmlns:p159="http://schemas.microsoft.com/office/powerpoint/2015/09/main" Requires="p159">
+  <mc:AlternateContent xmlns:mc="http://schemas.openxmlformats.org/markup-compatibility/2006" xmlns:p159="http://schemas.microsoft.com/office/powerpoint/2015/09/main">
+    <mc:Choice Requires="p159">
       <p:transition xmlns:p14="http://schemas.microsoft.com/office/powerpoint/2010/main" spd="slow" p14:dur="2000">
         <p159:morph option="byObject"/>
       </p:transition>
     </mc:Choice>
-    <mc:Fallback>
+    <mc:Fallback xmlns="">
       <p:transition spd="slow">
         <p:fade/>
       </p:transition>
@@ -10539,13 +10539,13 @@
   <p:clrMapOvr>
     <a:masterClrMapping/>
   </p:clrMapOvr>
-  <mc:AlternateContent xmlns:mc="http://schemas.openxmlformats.org/markup-compatibility/2006">
-    <mc:Choice xmlns:p159="http://schemas.microsoft.com/office/powerpoint/2015/09/main" Requires="p159">
+  <mc:AlternateContent xmlns:mc="http://schemas.openxmlformats.org/markup-compatibility/2006" xmlns:p159="http://schemas.microsoft.com/office/powerpoint/2015/09/main">
+    <mc:Choice Requires="p159">
       <p:transition xmlns:p14="http://schemas.microsoft.com/office/powerpoint/2010/main" spd="slow" p14:dur="2000">
         <p159:morph option="byObject"/>
       </p:transition>
     </mc:Choice>
-    <mc:Fallback>
+    <mc:Fallback xmlns="">
       <p:transition spd="slow">
         <p:fade/>
       </p:transition>
@@ -10793,13 +10793,13 @@
   <p:clrMapOvr>
     <a:masterClrMapping/>
   </p:clrMapOvr>
-  <mc:AlternateContent xmlns:mc="http://schemas.openxmlformats.org/markup-compatibility/2006">
-    <mc:Choice xmlns:p159="http://schemas.microsoft.com/office/powerpoint/2015/09/main" Requires="p159">
+  <mc:AlternateContent xmlns:mc="http://schemas.openxmlformats.org/markup-compatibility/2006" xmlns:p159="http://schemas.microsoft.com/office/powerpoint/2015/09/main">
+    <mc:Choice Requires="p159">
       <p:transition xmlns:p14="http://schemas.microsoft.com/office/powerpoint/2010/main" spd="slow" p14:dur="2000">
         <p159:morph option="byObject"/>
       </p:transition>
     </mc:Choice>
-    <mc:Fallback>
+    <mc:Fallback xmlns="">
       <p:transition spd="slow">
         <p:fade/>
       </p:transition>
@@ -11744,13 +11744,13 @@
   <p:clrMapOvr>
     <a:masterClrMapping/>
   </p:clrMapOvr>
-  <mc:AlternateContent xmlns:mc="http://schemas.openxmlformats.org/markup-compatibility/2006">
-    <mc:Choice xmlns:p159="http://schemas.microsoft.com/office/powerpoint/2015/09/main" Requires="p159">
+  <mc:AlternateContent xmlns:mc="http://schemas.openxmlformats.org/markup-compatibility/2006" xmlns:p159="http://schemas.microsoft.com/office/powerpoint/2015/09/main">
+    <mc:Choice Requires="p159">
       <p:transition xmlns:p14="http://schemas.microsoft.com/office/powerpoint/2010/main" spd="slow" p14:dur="2000">
         <p159:morph option="byObject"/>
       </p:transition>
     </mc:Choice>
-    <mc:Fallback>
+    <mc:Fallback xmlns="">
       <p:transition spd="slow">
         <p:fade/>
       </p:transition>
@@ -12204,13 +12204,13 @@
   <p:clrMapOvr>
     <a:masterClrMapping/>
   </p:clrMapOvr>
-  <mc:AlternateContent xmlns:mc="http://schemas.openxmlformats.org/markup-compatibility/2006">
-    <mc:Choice xmlns:p159="http://schemas.microsoft.com/office/powerpoint/2015/09/main" Requires="p159">
+  <mc:AlternateContent xmlns:mc="http://schemas.openxmlformats.org/markup-compatibility/2006" xmlns:p159="http://schemas.microsoft.com/office/powerpoint/2015/09/main">
+    <mc:Choice Requires="p159">
       <p:transition xmlns:p14="http://schemas.microsoft.com/office/powerpoint/2010/main" spd="slow" p14:dur="2000">
         <p159:morph option="byObject"/>
       </p:transition>
     </mc:Choice>
-    <mc:Fallback>
+    <mc:Fallback xmlns="">
       <p:transition spd="slow">
         <p:fade/>
       </p:transition>

</xml_diff>